<commit_message>
Added notes to the presentation, completed presentation.
</commit_message>
<xml_diff>
--- a/presentation/Validierung von Aussagen auf Versicherungs-Anträgen mithilfe ML.pptx
+++ b/presentation/Validierung von Aussagen auf Versicherungs-Anträgen mithilfe ML.pptx
@@ -4,6 +4,9 @@
   <p:sldMasterIdLst>
     <p:sldMasterId id="2147483696" r:id="rId1"/>
   </p:sldMasterIdLst>
+  <p:notesMasterIdLst>
+    <p:notesMasterId r:id="rId12"/>
+  </p:notesMasterIdLst>
   <p:sldIdLst>
     <p:sldId id="256" r:id="rId2"/>
     <p:sldId id="257" r:id="rId3"/>
@@ -4683,7 +4686,7 @@
   <dgm:whole/>
   <dgm:extLst>
     <a:ext uri="http://schemas.microsoft.com/office/drawing/2008/diagram">
-      <dsp:dataModelExt xmlns:dsp="http://schemas.microsoft.com/office/drawing/2008/diagram" relId="rId6" minVer="http://schemas.openxmlformats.org/drawingml/2006/diagram"/>
+      <dsp:dataModelExt xmlns:dsp="http://schemas.microsoft.com/office/drawing/2008/diagram" relId="rId7" minVer="http://schemas.openxmlformats.org/drawingml/2006/diagram"/>
     </a:ext>
   </dgm:extLst>
 </dgm:dataModel>
@@ -5826,7 +5829,7 @@
   <dgm:whole/>
   <dgm:extLst>
     <a:ext uri="http://schemas.microsoft.com/office/drawing/2008/diagram">
-      <dsp:dataModelExt xmlns:dsp="http://schemas.microsoft.com/office/drawing/2008/diagram" relId="rId6" minVer="http://schemas.openxmlformats.org/drawingml/2006/diagram"/>
+      <dsp:dataModelExt xmlns:dsp="http://schemas.microsoft.com/office/drawing/2008/diagram" relId="rId7" minVer="http://schemas.openxmlformats.org/drawingml/2006/diagram"/>
     </a:ext>
   </dgm:extLst>
 </dgm:dataModel>
@@ -10248,6 +10251,1324 @@
     </dgm:style>
   </dgm:styleLbl>
 </dgm:styleDef>
+</file>
+
+<file path=ppt/notesMasters/notesMaster1.xml><?xml version="1.0" encoding="utf-8"?>
+<p:notesMaster xmlns:a="http://schemas.openxmlformats.org/drawingml/2006/main" xmlns:r="http://schemas.openxmlformats.org/officeDocument/2006/relationships" xmlns:p="http://schemas.openxmlformats.org/presentationml/2006/main">
+  <p:cSld>
+    <p:bg>
+      <p:bgRef idx="1001">
+        <a:schemeClr val="bg1"/>
+      </p:bgRef>
+    </p:bg>
+    <p:spTree>
+      <p:nvGrpSpPr>
+        <p:cNvPr id="1" name=""/>
+        <p:cNvGrpSpPr/>
+        <p:nvPr/>
+      </p:nvGrpSpPr>
+      <p:grpSpPr>
+        <a:xfrm>
+          <a:off x="0" y="0"/>
+          <a:ext cx="0" cy="0"/>
+          <a:chOff x="0" y="0"/>
+          <a:chExt cx="0" cy="0"/>
+        </a:xfrm>
+      </p:grpSpPr>
+      <p:sp>
+        <p:nvSpPr>
+          <p:cNvPr id="2" name="Kopfzeilenplatzhalter 1"/>
+          <p:cNvSpPr>
+            <a:spLocks noGrp="1"/>
+          </p:cNvSpPr>
+          <p:nvPr>
+            <p:ph type="hdr" sz="quarter"/>
+          </p:nvPr>
+        </p:nvSpPr>
+        <p:spPr>
+          <a:xfrm>
+            <a:off x="0" y="0"/>
+            <a:ext cx="2971800" cy="458788"/>
+          </a:xfrm>
+          <a:prstGeom prst="rect">
+            <a:avLst/>
+          </a:prstGeom>
+        </p:spPr>
+        <p:txBody>
+          <a:bodyPr vert="horz" lIns="91440" tIns="45720" rIns="91440" bIns="45720" rtlCol="0"/>
+          <a:lstStyle>
+            <a:lvl1pPr algn="l">
+              <a:defRPr sz="1200"/>
+            </a:lvl1pPr>
+          </a:lstStyle>
+          <a:p>
+            <a:endParaRPr lang="de-DE"/>
+          </a:p>
+        </p:txBody>
+      </p:sp>
+      <p:sp>
+        <p:nvSpPr>
+          <p:cNvPr id="3" name="Datumsplatzhalter 2"/>
+          <p:cNvSpPr>
+            <a:spLocks noGrp="1"/>
+          </p:cNvSpPr>
+          <p:nvPr>
+            <p:ph type="dt" idx="1"/>
+          </p:nvPr>
+        </p:nvSpPr>
+        <p:spPr>
+          <a:xfrm>
+            <a:off x="3884613" y="0"/>
+            <a:ext cx="2971800" cy="458788"/>
+          </a:xfrm>
+          <a:prstGeom prst="rect">
+            <a:avLst/>
+          </a:prstGeom>
+        </p:spPr>
+        <p:txBody>
+          <a:bodyPr vert="horz" lIns="91440" tIns="45720" rIns="91440" bIns="45720" rtlCol="0"/>
+          <a:lstStyle>
+            <a:lvl1pPr algn="r">
+              <a:defRPr sz="1200"/>
+            </a:lvl1pPr>
+          </a:lstStyle>
+          <a:p>
+            <a:fld id="{826FEFDD-86C6-47A0-9002-658D338F288E}" type="datetimeFigureOut">
+              <a:rPr lang="de-DE" smtClean="0"/>
+              <a:t>24.06.2022</a:t>
+            </a:fld>
+            <a:endParaRPr lang="de-DE"/>
+          </a:p>
+        </p:txBody>
+      </p:sp>
+      <p:sp>
+        <p:nvSpPr>
+          <p:cNvPr id="4" name="Folienbildplatzhalter 3"/>
+          <p:cNvSpPr>
+            <a:spLocks noGrp="1" noRot="1" noChangeAspect="1"/>
+          </p:cNvSpPr>
+          <p:nvPr>
+            <p:ph type="sldImg" idx="2"/>
+          </p:nvPr>
+        </p:nvSpPr>
+        <p:spPr>
+          <a:xfrm>
+            <a:off x="685800" y="1143000"/>
+            <a:ext cx="5486400" cy="3086100"/>
+          </a:xfrm>
+          <a:prstGeom prst="rect">
+            <a:avLst/>
+          </a:prstGeom>
+          <a:noFill/>
+          <a:ln w="12700">
+            <a:solidFill>
+              <a:prstClr val="black"/>
+            </a:solidFill>
+          </a:ln>
+        </p:spPr>
+        <p:txBody>
+          <a:bodyPr vert="horz" lIns="91440" tIns="45720" rIns="91440" bIns="45720" rtlCol="0" anchor="ctr"/>
+          <a:lstStyle/>
+          <a:p>
+            <a:endParaRPr lang="de-DE"/>
+          </a:p>
+        </p:txBody>
+      </p:sp>
+      <p:sp>
+        <p:nvSpPr>
+          <p:cNvPr id="5" name="Notizenplatzhalter 4"/>
+          <p:cNvSpPr>
+            <a:spLocks noGrp="1"/>
+          </p:cNvSpPr>
+          <p:nvPr>
+            <p:ph type="body" sz="quarter" idx="3"/>
+          </p:nvPr>
+        </p:nvSpPr>
+        <p:spPr>
+          <a:xfrm>
+            <a:off x="685800" y="4400550"/>
+            <a:ext cx="5486400" cy="3600450"/>
+          </a:xfrm>
+          <a:prstGeom prst="rect">
+            <a:avLst/>
+          </a:prstGeom>
+        </p:spPr>
+        <p:txBody>
+          <a:bodyPr vert="horz" lIns="91440" tIns="45720" rIns="91440" bIns="45720" rtlCol="0"/>
+          <a:lstStyle/>
+          <a:p>
+            <a:pPr lvl="0"/>
+            <a:r>
+              <a:rPr lang="de-DE"/>
+              <a:t>Mastertextformat bearbeiten</a:t>
+            </a:r>
+          </a:p>
+          <a:p>
+            <a:pPr lvl="1"/>
+            <a:r>
+              <a:rPr lang="de-DE"/>
+              <a:t>Zweite Ebene</a:t>
+            </a:r>
+          </a:p>
+          <a:p>
+            <a:pPr lvl="2"/>
+            <a:r>
+              <a:rPr lang="de-DE"/>
+              <a:t>Dritte Ebene</a:t>
+            </a:r>
+          </a:p>
+          <a:p>
+            <a:pPr lvl="3"/>
+            <a:r>
+              <a:rPr lang="de-DE"/>
+              <a:t>Vierte Ebene</a:t>
+            </a:r>
+          </a:p>
+          <a:p>
+            <a:pPr lvl="4"/>
+            <a:r>
+              <a:rPr lang="de-DE"/>
+              <a:t>Fünfte Ebene</a:t>
+            </a:r>
+          </a:p>
+        </p:txBody>
+      </p:sp>
+      <p:sp>
+        <p:nvSpPr>
+          <p:cNvPr id="6" name="Fußzeilenplatzhalter 5"/>
+          <p:cNvSpPr>
+            <a:spLocks noGrp="1"/>
+          </p:cNvSpPr>
+          <p:nvPr>
+            <p:ph type="ftr" sz="quarter" idx="4"/>
+          </p:nvPr>
+        </p:nvSpPr>
+        <p:spPr>
+          <a:xfrm>
+            <a:off x="0" y="8685213"/>
+            <a:ext cx="2971800" cy="458787"/>
+          </a:xfrm>
+          <a:prstGeom prst="rect">
+            <a:avLst/>
+          </a:prstGeom>
+        </p:spPr>
+        <p:txBody>
+          <a:bodyPr vert="horz" lIns="91440" tIns="45720" rIns="91440" bIns="45720" rtlCol="0" anchor="b"/>
+          <a:lstStyle>
+            <a:lvl1pPr algn="l">
+              <a:defRPr sz="1200"/>
+            </a:lvl1pPr>
+          </a:lstStyle>
+          <a:p>
+            <a:endParaRPr lang="de-DE"/>
+          </a:p>
+        </p:txBody>
+      </p:sp>
+      <p:sp>
+        <p:nvSpPr>
+          <p:cNvPr id="7" name="Foliennummernplatzhalter 6"/>
+          <p:cNvSpPr>
+            <a:spLocks noGrp="1"/>
+          </p:cNvSpPr>
+          <p:nvPr>
+            <p:ph type="sldNum" sz="quarter" idx="5"/>
+          </p:nvPr>
+        </p:nvSpPr>
+        <p:spPr>
+          <a:xfrm>
+            <a:off x="3884613" y="8685213"/>
+            <a:ext cx="2971800" cy="458787"/>
+          </a:xfrm>
+          <a:prstGeom prst="rect">
+            <a:avLst/>
+          </a:prstGeom>
+        </p:spPr>
+        <p:txBody>
+          <a:bodyPr vert="horz" lIns="91440" tIns="45720" rIns="91440" bIns="45720" rtlCol="0" anchor="b"/>
+          <a:lstStyle>
+            <a:lvl1pPr algn="r">
+              <a:defRPr sz="1200"/>
+            </a:lvl1pPr>
+          </a:lstStyle>
+          <a:p>
+            <a:fld id="{87C8FFAB-5EC1-4C26-94C4-260FB07841FC}" type="slidenum">
+              <a:rPr lang="de-DE" smtClean="0"/>
+              <a:t>‹Nr.›</a:t>
+            </a:fld>
+            <a:endParaRPr lang="de-DE"/>
+          </a:p>
+        </p:txBody>
+      </p:sp>
+    </p:spTree>
+    <p:extLst>
+      <p:ext uri="{BB962C8B-B14F-4D97-AF65-F5344CB8AC3E}">
+        <p14:creationId xmlns:p14="http://schemas.microsoft.com/office/powerpoint/2010/main" val="1623240848"/>
+      </p:ext>
+    </p:extLst>
+  </p:cSld>
+  <p:clrMap bg1="lt1" tx1="dk1" bg2="lt2" tx2="dk2" accent1="accent1" accent2="accent2" accent3="accent3" accent4="accent4" accent5="accent5" accent6="accent6" hlink="hlink" folHlink="folHlink"/>
+  <p:notesStyle>
+    <a:lvl1pPr marL="0" algn="l" defTabSz="914400" rtl="0" eaLnBrk="1" latinLnBrk="0" hangingPunct="1">
+      <a:defRPr sz="1200" kern="1200">
+        <a:solidFill>
+          <a:schemeClr val="tx1"/>
+        </a:solidFill>
+        <a:latin typeface="+mn-lt"/>
+        <a:ea typeface="+mn-ea"/>
+        <a:cs typeface="+mn-cs"/>
+      </a:defRPr>
+    </a:lvl1pPr>
+    <a:lvl2pPr marL="457200" algn="l" defTabSz="914400" rtl="0" eaLnBrk="1" latinLnBrk="0" hangingPunct="1">
+      <a:defRPr sz="1200" kern="1200">
+        <a:solidFill>
+          <a:schemeClr val="tx1"/>
+        </a:solidFill>
+        <a:latin typeface="+mn-lt"/>
+        <a:ea typeface="+mn-ea"/>
+        <a:cs typeface="+mn-cs"/>
+      </a:defRPr>
+    </a:lvl2pPr>
+    <a:lvl3pPr marL="914400" algn="l" defTabSz="914400" rtl="0" eaLnBrk="1" latinLnBrk="0" hangingPunct="1">
+      <a:defRPr sz="1200" kern="1200">
+        <a:solidFill>
+          <a:schemeClr val="tx1"/>
+        </a:solidFill>
+        <a:latin typeface="+mn-lt"/>
+        <a:ea typeface="+mn-ea"/>
+        <a:cs typeface="+mn-cs"/>
+      </a:defRPr>
+    </a:lvl3pPr>
+    <a:lvl4pPr marL="1371600" algn="l" defTabSz="914400" rtl="0" eaLnBrk="1" latinLnBrk="0" hangingPunct="1">
+      <a:defRPr sz="1200" kern="1200">
+        <a:solidFill>
+          <a:schemeClr val="tx1"/>
+        </a:solidFill>
+        <a:latin typeface="+mn-lt"/>
+        <a:ea typeface="+mn-ea"/>
+        <a:cs typeface="+mn-cs"/>
+      </a:defRPr>
+    </a:lvl4pPr>
+    <a:lvl5pPr marL="1828800" algn="l" defTabSz="914400" rtl="0" eaLnBrk="1" latinLnBrk="0" hangingPunct="1">
+      <a:defRPr sz="1200" kern="1200">
+        <a:solidFill>
+          <a:schemeClr val="tx1"/>
+        </a:solidFill>
+        <a:latin typeface="+mn-lt"/>
+        <a:ea typeface="+mn-ea"/>
+        <a:cs typeface="+mn-cs"/>
+      </a:defRPr>
+    </a:lvl5pPr>
+    <a:lvl6pPr marL="2286000" algn="l" defTabSz="914400" rtl="0" eaLnBrk="1" latinLnBrk="0" hangingPunct="1">
+      <a:defRPr sz="1200" kern="1200">
+        <a:solidFill>
+          <a:schemeClr val="tx1"/>
+        </a:solidFill>
+        <a:latin typeface="+mn-lt"/>
+        <a:ea typeface="+mn-ea"/>
+        <a:cs typeface="+mn-cs"/>
+      </a:defRPr>
+    </a:lvl6pPr>
+    <a:lvl7pPr marL="2743200" algn="l" defTabSz="914400" rtl="0" eaLnBrk="1" latinLnBrk="0" hangingPunct="1">
+      <a:defRPr sz="1200" kern="1200">
+        <a:solidFill>
+          <a:schemeClr val="tx1"/>
+        </a:solidFill>
+        <a:latin typeface="+mn-lt"/>
+        <a:ea typeface="+mn-ea"/>
+        <a:cs typeface="+mn-cs"/>
+      </a:defRPr>
+    </a:lvl7pPr>
+    <a:lvl8pPr marL="3200400" algn="l" defTabSz="914400" rtl="0" eaLnBrk="1" latinLnBrk="0" hangingPunct="1">
+      <a:defRPr sz="1200" kern="1200">
+        <a:solidFill>
+          <a:schemeClr val="tx1"/>
+        </a:solidFill>
+        <a:latin typeface="+mn-lt"/>
+        <a:ea typeface="+mn-ea"/>
+        <a:cs typeface="+mn-cs"/>
+      </a:defRPr>
+    </a:lvl8pPr>
+    <a:lvl9pPr marL="3657600" algn="l" defTabSz="914400" rtl="0" eaLnBrk="1" latinLnBrk="0" hangingPunct="1">
+      <a:defRPr sz="1200" kern="1200">
+        <a:solidFill>
+          <a:schemeClr val="tx1"/>
+        </a:solidFill>
+        <a:latin typeface="+mn-lt"/>
+        <a:ea typeface="+mn-ea"/>
+        <a:cs typeface="+mn-cs"/>
+      </a:defRPr>
+    </a:lvl9pPr>
+  </p:notesStyle>
+</p:notesMaster>
+</file>
+
+<file path=ppt/notesSlides/notesSlide1.xml><?xml version="1.0" encoding="utf-8"?>
+<p:notes xmlns:a="http://schemas.openxmlformats.org/drawingml/2006/main" xmlns:r="http://schemas.openxmlformats.org/officeDocument/2006/relationships" xmlns:p="http://schemas.openxmlformats.org/presentationml/2006/main">
+  <p:cSld>
+    <p:spTree>
+      <p:nvGrpSpPr>
+        <p:cNvPr id="1" name=""/>
+        <p:cNvGrpSpPr/>
+        <p:nvPr/>
+      </p:nvGrpSpPr>
+      <p:grpSpPr>
+        <a:xfrm>
+          <a:off x="0" y="0"/>
+          <a:ext cx="0" cy="0"/>
+          <a:chOff x="0" y="0"/>
+          <a:chExt cx="0" cy="0"/>
+        </a:xfrm>
+      </p:grpSpPr>
+      <p:sp>
+        <p:nvSpPr>
+          <p:cNvPr id="2" name="Folienbildplatzhalter 1"/>
+          <p:cNvSpPr>
+            <a:spLocks noGrp="1" noRot="1" noChangeAspect="1"/>
+          </p:cNvSpPr>
+          <p:nvPr>
+            <p:ph type="sldImg"/>
+          </p:nvPr>
+        </p:nvSpPr>
+        <p:spPr/>
+      </p:sp>
+      <p:sp>
+        <p:nvSpPr>
+          <p:cNvPr id="3" name="Notizenplatzhalter 2"/>
+          <p:cNvSpPr>
+            <a:spLocks noGrp="1"/>
+          </p:cNvSpPr>
+          <p:nvPr>
+            <p:ph type="body" idx="1"/>
+          </p:nvPr>
+        </p:nvSpPr>
+        <p:spPr/>
+        <p:txBody>
+          <a:bodyPr/>
+          <a:lstStyle/>
+          <a:p>
+            <a:endParaRPr lang="de-DE" dirty="0"/>
+          </a:p>
+        </p:txBody>
+      </p:sp>
+      <p:sp>
+        <p:nvSpPr>
+          <p:cNvPr id="4" name="Foliennummernplatzhalter 3"/>
+          <p:cNvSpPr>
+            <a:spLocks noGrp="1"/>
+          </p:cNvSpPr>
+          <p:nvPr>
+            <p:ph type="sldNum" sz="quarter" idx="5"/>
+          </p:nvPr>
+        </p:nvSpPr>
+        <p:spPr/>
+        <p:txBody>
+          <a:bodyPr/>
+          <a:lstStyle/>
+          <a:p>
+            <a:fld id="{87C8FFAB-5EC1-4C26-94C4-260FB07841FC}" type="slidenum">
+              <a:rPr lang="de-DE" smtClean="0"/>
+              <a:t>2</a:t>
+            </a:fld>
+            <a:endParaRPr lang="de-DE"/>
+          </a:p>
+        </p:txBody>
+      </p:sp>
+    </p:spTree>
+    <p:extLst>
+      <p:ext uri="{BB962C8B-B14F-4D97-AF65-F5344CB8AC3E}">
+        <p14:creationId xmlns:p14="http://schemas.microsoft.com/office/powerpoint/2010/main" val="2678453016"/>
+      </p:ext>
+    </p:extLst>
+  </p:cSld>
+  <p:clrMapOvr>
+    <a:masterClrMapping/>
+  </p:clrMapOvr>
+</p:notes>
+</file>
+
+<file path=ppt/notesSlides/notesSlide2.xml><?xml version="1.0" encoding="utf-8"?>
+<p:notes xmlns:a="http://schemas.openxmlformats.org/drawingml/2006/main" xmlns:r="http://schemas.openxmlformats.org/officeDocument/2006/relationships" xmlns:p="http://schemas.openxmlformats.org/presentationml/2006/main">
+  <p:cSld>
+    <p:spTree>
+      <p:nvGrpSpPr>
+        <p:cNvPr id="1" name=""/>
+        <p:cNvGrpSpPr/>
+        <p:nvPr/>
+      </p:nvGrpSpPr>
+      <p:grpSpPr>
+        <a:xfrm>
+          <a:off x="0" y="0"/>
+          <a:ext cx="0" cy="0"/>
+          <a:chOff x="0" y="0"/>
+          <a:chExt cx="0" cy="0"/>
+        </a:xfrm>
+      </p:grpSpPr>
+      <p:sp>
+        <p:nvSpPr>
+          <p:cNvPr id="2" name="Folienbildplatzhalter 1"/>
+          <p:cNvSpPr>
+            <a:spLocks noGrp="1" noRot="1" noChangeAspect="1"/>
+          </p:cNvSpPr>
+          <p:nvPr>
+            <p:ph type="sldImg"/>
+          </p:nvPr>
+        </p:nvSpPr>
+        <p:spPr/>
+      </p:sp>
+      <p:sp>
+        <p:nvSpPr>
+          <p:cNvPr id="3" name="Notizenplatzhalter 2"/>
+          <p:cNvSpPr>
+            <a:spLocks noGrp="1"/>
+          </p:cNvSpPr>
+          <p:nvPr>
+            <p:ph type="body" idx="1"/>
+          </p:nvPr>
+        </p:nvSpPr>
+        <p:spPr/>
+        <p:txBody>
+          <a:bodyPr/>
+          <a:lstStyle/>
+          <a:p>
+            <a:pPr marL="171450" indent="-171450">
+              <a:buFontTx/>
+              <a:buChar char="-"/>
+            </a:pPr>
+            <a:r>
+              <a:rPr lang="de-DE" dirty="0"/>
+              <a:t>Den Datensatz haben wir von </a:t>
+            </a:r>
+            <a:r>
+              <a:rPr lang="de-DE" dirty="0" err="1"/>
+              <a:t>Kaggle</a:t>
+            </a:r>
+            <a:r>
+              <a:rPr lang="de-DE" dirty="0"/>
+              <a:t>, die dort angegebene Original-Quelle war allerdings auf koreanisch und daher nicht für uns nicht verifizierbar</a:t>
+            </a:r>
+          </a:p>
+          <a:p>
+            <a:pPr marL="171450" indent="-171450">
+              <a:buFontTx/>
+              <a:buChar char="-"/>
+            </a:pPr>
+            <a:r>
+              <a:rPr lang="de-DE" dirty="0"/>
+              <a:t>Die Durchschnitte mancher Merkmale wie Körpergröße und Gewicht lassen aber auf Datensammlung in (Süd-)Korea schließen</a:t>
+            </a:r>
+          </a:p>
+          <a:p>
+            <a:pPr marL="171450" indent="-171450">
+              <a:buFontTx/>
+              <a:buChar char="-"/>
+            </a:pPr>
+            <a:r>
+              <a:rPr lang="de-DE" dirty="0"/>
+              <a:t>Siehe </a:t>
+            </a:r>
+            <a:r>
+              <a:rPr lang="de-DE" dirty="0" err="1"/>
+              <a:t>summary</a:t>
+            </a:r>
+            <a:r>
+              <a:rPr lang="de-DE" dirty="0"/>
+              <a:t> des Datensatzes, daraus wurden 2 Merkmale (ID und oral) ausgelassen, weil sie keine Bedeutung haben</a:t>
+            </a:r>
+          </a:p>
+        </p:txBody>
+      </p:sp>
+      <p:sp>
+        <p:nvSpPr>
+          <p:cNvPr id="4" name="Foliennummernplatzhalter 3"/>
+          <p:cNvSpPr>
+            <a:spLocks noGrp="1"/>
+          </p:cNvSpPr>
+          <p:nvPr>
+            <p:ph type="sldNum" sz="quarter" idx="5"/>
+          </p:nvPr>
+        </p:nvSpPr>
+        <p:spPr/>
+        <p:txBody>
+          <a:bodyPr/>
+          <a:lstStyle/>
+          <a:p>
+            <a:fld id="{87C8FFAB-5EC1-4C26-94C4-260FB07841FC}" type="slidenum">
+              <a:rPr lang="de-DE" smtClean="0"/>
+              <a:t>3</a:t>
+            </a:fld>
+            <a:endParaRPr lang="de-DE"/>
+          </a:p>
+        </p:txBody>
+      </p:sp>
+    </p:spTree>
+    <p:extLst>
+      <p:ext uri="{BB962C8B-B14F-4D97-AF65-F5344CB8AC3E}">
+        <p14:creationId xmlns:p14="http://schemas.microsoft.com/office/powerpoint/2010/main" val="4193498684"/>
+      </p:ext>
+    </p:extLst>
+  </p:cSld>
+  <p:clrMapOvr>
+    <a:masterClrMapping/>
+  </p:clrMapOvr>
+</p:notes>
+</file>
+
+<file path=ppt/notesSlides/notesSlide3.xml><?xml version="1.0" encoding="utf-8"?>
+<p:notes xmlns:a="http://schemas.openxmlformats.org/drawingml/2006/main" xmlns:r="http://schemas.openxmlformats.org/officeDocument/2006/relationships" xmlns:p="http://schemas.openxmlformats.org/presentationml/2006/main">
+  <p:cSld>
+    <p:spTree>
+      <p:nvGrpSpPr>
+        <p:cNvPr id="1" name=""/>
+        <p:cNvGrpSpPr/>
+        <p:nvPr/>
+      </p:nvGrpSpPr>
+      <p:grpSpPr>
+        <a:xfrm>
+          <a:off x="0" y="0"/>
+          <a:ext cx="0" cy="0"/>
+          <a:chOff x="0" y="0"/>
+          <a:chExt cx="0" cy="0"/>
+        </a:xfrm>
+      </p:grpSpPr>
+      <p:sp>
+        <p:nvSpPr>
+          <p:cNvPr id="2" name="Folienbildplatzhalter 1"/>
+          <p:cNvSpPr>
+            <a:spLocks noGrp="1" noRot="1" noChangeAspect="1"/>
+          </p:cNvSpPr>
+          <p:nvPr>
+            <p:ph type="sldImg"/>
+          </p:nvPr>
+        </p:nvSpPr>
+        <p:spPr/>
+      </p:sp>
+      <p:sp>
+        <p:nvSpPr>
+          <p:cNvPr id="3" name="Notizenplatzhalter 2"/>
+          <p:cNvSpPr>
+            <a:spLocks noGrp="1"/>
+          </p:cNvSpPr>
+          <p:nvPr>
+            <p:ph type="body" idx="1"/>
+          </p:nvPr>
+        </p:nvSpPr>
+        <p:spPr/>
+        <p:txBody>
+          <a:bodyPr/>
+          <a:lstStyle/>
+          <a:p>
+            <a:r>
+              <a:rPr lang="de-DE" dirty="0"/>
+              <a:t>Nach ausführlicher Analyse und Gegenüberstellung der Werte von Rauchenden und Nichtrauchenden jeder Einflussvariable (24 Stück) ergab sich folgende Dimensionsreduktion:</a:t>
+            </a:r>
+          </a:p>
+          <a:p>
+            <a:pPr marL="171450" indent="-171450">
+              <a:buFontTx/>
+              <a:buChar char="-"/>
+            </a:pPr>
+            <a:r>
+              <a:rPr lang="de-DE" dirty="0"/>
+              <a:t>Merkmale, die kaum oder keine Unterschiede zwischen Rauchenden und Nichtrauchenden aufwiesen = Sehstärke, Hörvermögen und im Urin ausgeschiedenes Protein</a:t>
+            </a:r>
+          </a:p>
+          <a:p>
+            <a:pPr marL="171450" indent="-171450">
+              <a:buFontTx/>
+              <a:buChar char="-"/>
+            </a:pPr>
+            <a:r>
+              <a:rPr lang="de-DE" dirty="0"/>
+              <a:t>Merkmale, die redundante Daten abbilden = Cholesterin (redundant, weil es eine Einzelerfassung von LDL „schlechtes Cholesterin“ und HDL „gutes Cholesterin“ gibt, und der Cholesterin-Spiegel hauptsächlich von diesen Werten abhängt)</a:t>
+            </a:r>
+          </a:p>
+          <a:p>
+            <a:pPr marL="171450" indent="-171450">
+              <a:buFontTx/>
+              <a:buChar char="-"/>
+            </a:pPr>
+            <a:r>
+              <a:rPr lang="de-DE" dirty="0"/>
+              <a:t>Merkmale, die aneinander gekoppelt sind aber eines aussagekräftiger als das andere ist = LDL (da HDL größeren Unterschied aufweist), AST (nur bei schweren Lebererkrankungen auffindbar, ALT bereits bei leichten Leberschäden nachweisbar -&gt; besser für die Klassifikation von leberschädigendem Nikotin-Konsum geeignet)</a:t>
+            </a:r>
+          </a:p>
+        </p:txBody>
+      </p:sp>
+      <p:sp>
+        <p:nvSpPr>
+          <p:cNvPr id="4" name="Foliennummernplatzhalter 3"/>
+          <p:cNvSpPr>
+            <a:spLocks noGrp="1"/>
+          </p:cNvSpPr>
+          <p:nvPr>
+            <p:ph type="sldNum" sz="quarter" idx="5"/>
+          </p:nvPr>
+        </p:nvSpPr>
+        <p:spPr/>
+        <p:txBody>
+          <a:bodyPr/>
+          <a:lstStyle/>
+          <a:p>
+            <a:fld id="{87C8FFAB-5EC1-4C26-94C4-260FB07841FC}" type="slidenum">
+              <a:rPr lang="de-DE" smtClean="0"/>
+              <a:t>5</a:t>
+            </a:fld>
+            <a:endParaRPr lang="de-DE"/>
+          </a:p>
+        </p:txBody>
+      </p:sp>
+    </p:spTree>
+    <p:extLst>
+      <p:ext uri="{BB962C8B-B14F-4D97-AF65-F5344CB8AC3E}">
+        <p14:creationId xmlns:p14="http://schemas.microsoft.com/office/powerpoint/2010/main" val="1034613574"/>
+      </p:ext>
+    </p:extLst>
+  </p:cSld>
+  <p:clrMapOvr>
+    <a:masterClrMapping/>
+  </p:clrMapOvr>
+</p:notes>
+</file>
+
+<file path=ppt/notesSlides/notesSlide4.xml><?xml version="1.0" encoding="utf-8"?>
+<p:notes xmlns:a="http://schemas.openxmlformats.org/drawingml/2006/main" xmlns:r="http://schemas.openxmlformats.org/officeDocument/2006/relationships" xmlns:p="http://schemas.openxmlformats.org/presentationml/2006/main">
+  <p:cSld>
+    <p:spTree>
+      <p:nvGrpSpPr>
+        <p:cNvPr id="1" name=""/>
+        <p:cNvGrpSpPr/>
+        <p:nvPr/>
+      </p:nvGrpSpPr>
+      <p:grpSpPr>
+        <a:xfrm>
+          <a:off x="0" y="0"/>
+          <a:ext cx="0" cy="0"/>
+          <a:chOff x="0" y="0"/>
+          <a:chExt cx="0" cy="0"/>
+        </a:xfrm>
+      </p:grpSpPr>
+      <p:sp>
+        <p:nvSpPr>
+          <p:cNvPr id="2" name="Folienbildplatzhalter 1"/>
+          <p:cNvSpPr>
+            <a:spLocks noGrp="1" noRot="1" noChangeAspect="1"/>
+          </p:cNvSpPr>
+          <p:nvPr>
+            <p:ph type="sldImg"/>
+          </p:nvPr>
+        </p:nvSpPr>
+        <p:spPr/>
+      </p:sp>
+      <p:sp>
+        <p:nvSpPr>
+          <p:cNvPr id="3" name="Notizenplatzhalter 2"/>
+          <p:cNvSpPr>
+            <a:spLocks noGrp="1"/>
+          </p:cNvSpPr>
+          <p:nvPr>
+            <p:ph type="body" idx="1"/>
+          </p:nvPr>
+        </p:nvSpPr>
+        <p:spPr/>
+        <p:txBody>
+          <a:bodyPr/>
+          <a:lstStyle/>
+          <a:p>
+            <a:r>
+              <a:rPr lang="de-DE" dirty="0"/>
+              <a:t>Es sind also noch 16 Einflussvariablen in das Modelltraining eingeflossen. Hier eine Auswahl der interessantesten und ausschlaggebendsten:</a:t>
+            </a:r>
+          </a:p>
+          <a:p>
+            <a:pPr marL="171450" indent="-171450">
+              <a:buFontTx/>
+              <a:buChar char="-"/>
+            </a:pPr>
+            <a:r>
+              <a:rPr lang="de-DE" dirty="0"/>
+              <a:t>Körpergewicht in kg (gerundet auf 5kg Schritte): Es wird sehr deutlich, dass rauchende Personen zu höherem Körpergewicht neigen, der Durchschnitt unterscheidet sich um ganze 10kg</a:t>
+            </a:r>
+          </a:p>
+          <a:p>
+            <a:pPr marL="171450" indent="-171450">
+              <a:buFontTx/>
+              <a:buChar char="-"/>
+            </a:pPr>
+            <a:r>
+              <a:rPr lang="de-DE" dirty="0"/>
+              <a:t>Geschlecht: Den stärksten Unterschied, der auch später beim Training stark hervortrat, war das Geschlecht. Demnach rauchen nur etwa 4% der Frauen, dagegen gut 55% der Männer. Dies liegt in Korea aber an gesellschaftlichen Normen. Rauchen ist dort eher </a:t>
+            </a:r>
+            <a:r>
+              <a:rPr lang="de-DE" dirty="0" err="1"/>
+              <a:t>verpöhnt</a:t>
+            </a:r>
+            <a:r>
+              <a:rPr lang="de-DE" dirty="0"/>
+              <a:t>, vor allem unter Frauen.</a:t>
+            </a:r>
+          </a:p>
+          <a:p>
+            <a:pPr marL="171450" indent="-171450">
+              <a:buFontTx/>
+              <a:buChar char="-"/>
+            </a:pPr>
+            <a:r>
+              <a:rPr lang="de-DE" dirty="0"/>
+              <a:t>Blutdruck (Herz zusammengezogen und entspannt): Beide Blutdruckwerte sind bei rauchenden Personen tendenziell erhöht</a:t>
+            </a:r>
+          </a:p>
+          <a:p>
+            <a:pPr marL="171450" indent="-171450">
+              <a:buFontTx/>
+              <a:buChar char="-"/>
+            </a:pPr>
+            <a:r>
+              <a:rPr lang="de-DE" dirty="0"/>
+              <a:t>Alter: Interessant war zu erkennen, dass der Kern der rauchenden Gesellschaft im Schnitt um 5 Jahre jünger ist als der, der nichtrauchenden</a:t>
+            </a:r>
+          </a:p>
+          <a:p>
+            <a:pPr marL="171450" indent="-171450">
+              <a:buFontTx/>
+              <a:buChar char="-"/>
+            </a:pPr>
+            <a:r>
+              <a:rPr lang="de-DE" dirty="0"/>
+              <a:t>Triglyceride: Die Menge von sogenannten Neutral-Fetten, die als die gefährlichsten für Menschen gelten und sich vor allem im Bauchraum ansammeln, sind bei rauchenden Personen deutlich erhöht (hängt mit Körpergewicht zusammen)</a:t>
+            </a:r>
+          </a:p>
+          <a:p>
+            <a:pPr marL="171450" indent="-171450">
+              <a:buFontTx/>
+              <a:buChar char="-"/>
+            </a:pPr>
+            <a:endParaRPr lang="de-DE" dirty="0"/>
+          </a:p>
+        </p:txBody>
+      </p:sp>
+      <p:sp>
+        <p:nvSpPr>
+          <p:cNvPr id="4" name="Foliennummernplatzhalter 3"/>
+          <p:cNvSpPr>
+            <a:spLocks noGrp="1"/>
+          </p:cNvSpPr>
+          <p:nvPr>
+            <p:ph type="sldNum" sz="quarter" idx="5"/>
+          </p:nvPr>
+        </p:nvSpPr>
+        <p:spPr/>
+        <p:txBody>
+          <a:bodyPr/>
+          <a:lstStyle/>
+          <a:p>
+            <a:fld id="{87C8FFAB-5EC1-4C26-94C4-260FB07841FC}" type="slidenum">
+              <a:rPr lang="de-DE" smtClean="0"/>
+              <a:t>6</a:t>
+            </a:fld>
+            <a:endParaRPr lang="de-DE"/>
+          </a:p>
+        </p:txBody>
+      </p:sp>
+    </p:spTree>
+    <p:extLst>
+      <p:ext uri="{BB962C8B-B14F-4D97-AF65-F5344CB8AC3E}">
+        <p14:creationId xmlns:p14="http://schemas.microsoft.com/office/powerpoint/2010/main" val="801618080"/>
+      </p:ext>
+    </p:extLst>
+  </p:cSld>
+  <p:clrMapOvr>
+    <a:masterClrMapping/>
+  </p:clrMapOvr>
+</p:notes>
+</file>
+
+<file path=ppt/notesSlides/notesSlide5.xml><?xml version="1.0" encoding="utf-8"?>
+<p:notes xmlns:a="http://schemas.openxmlformats.org/drawingml/2006/main" xmlns:r="http://schemas.openxmlformats.org/officeDocument/2006/relationships" xmlns:p="http://schemas.openxmlformats.org/presentationml/2006/main">
+  <p:cSld>
+    <p:spTree>
+      <p:nvGrpSpPr>
+        <p:cNvPr id="1" name=""/>
+        <p:cNvGrpSpPr/>
+        <p:nvPr/>
+      </p:nvGrpSpPr>
+      <p:grpSpPr>
+        <a:xfrm>
+          <a:off x="0" y="0"/>
+          <a:ext cx="0" cy="0"/>
+          <a:chOff x="0" y="0"/>
+          <a:chExt cx="0" cy="0"/>
+        </a:xfrm>
+      </p:grpSpPr>
+      <p:sp>
+        <p:nvSpPr>
+          <p:cNvPr id="2" name="Folienbildplatzhalter 1"/>
+          <p:cNvSpPr>
+            <a:spLocks noGrp="1" noRot="1" noChangeAspect="1"/>
+          </p:cNvSpPr>
+          <p:nvPr>
+            <p:ph type="sldImg"/>
+          </p:nvPr>
+        </p:nvSpPr>
+        <p:spPr/>
+      </p:sp>
+      <p:sp>
+        <p:nvSpPr>
+          <p:cNvPr id="3" name="Notizenplatzhalter 2"/>
+          <p:cNvSpPr>
+            <a:spLocks noGrp="1"/>
+          </p:cNvSpPr>
+          <p:nvPr>
+            <p:ph type="body" idx="1"/>
+          </p:nvPr>
+        </p:nvSpPr>
+        <p:spPr/>
+        <p:txBody>
+          <a:bodyPr/>
+          <a:lstStyle/>
+          <a:p>
+            <a:r>
+              <a:rPr lang="de-DE" dirty="0"/>
+              <a:t>Weitere interessante Einflussvariablen:</a:t>
+            </a:r>
+          </a:p>
+          <a:p>
+            <a:pPr marL="171450" indent="-171450">
+              <a:buFontTx/>
+              <a:buChar char="-"/>
+            </a:pPr>
+            <a:r>
+              <a:rPr lang="de-DE" dirty="0"/>
+              <a:t>GTP: GTP ist ein Stoff der die Funktion von Neurotransmittern im Gehirn hemmt. Hier sieht man deutlich, dass rauchende Personen also im wahrsten Sinne des Wortes fortschreitend benebelt werden.</a:t>
+            </a:r>
+          </a:p>
+          <a:p>
+            <a:pPr marL="171450" indent="-171450">
+              <a:buFontTx/>
+              <a:buChar char="-"/>
+            </a:pPr>
+            <a:r>
+              <a:rPr lang="de-DE" dirty="0"/>
+              <a:t>Hämoglobin: Ein besonders signifikanter Indikator für das Rauchen ist die deutliche Erhöhung des roten Blutfarbstoffes Hämoglobin, da das Nikotin diesen direkt angreift und der Körper daher mehr von dem überlebenswichtigen Stoff nachproduzieren muss.</a:t>
+            </a:r>
+          </a:p>
+          <a:p>
+            <a:pPr marL="171450" indent="-171450">
+              <a:buFontTx/>
+              <a:buChar char="-"/>
+            </a:pPr>
+            <a:r>
+              <a:rPr lang="de-DE" dirty="0"/>
+              <a:t>ALT: Der bereits in Zusammenhang mit AST angesprochene Leber-Entzündungswert ALT ist bereits bei leichten Leberschäden nachweisbar und tritt daher bei rauchenden Personen erkennbar häufiger auf.</a:t>
+            </a:r>
+          </a:p>
+          <a:p>
+            <a:pPr marL="171450" indent="-171450">
+              <a:buFontTx/>
+              <a:buChar char="-"/>
+            </a:pPr>
+            <a:r>
+              <a:rPr lang="de-DE" dirty="0"/>
+              <a:t>Karies und Zahnbelag: Schließlich haben wir hier noch zwei 4-Felder-Tafeln von binärem Aufkommen von Karies und Zahnbelag aufgenommen. Es ist zu entnehmen, dass rauchende Personen 10 Prozentpunkte häufiger unter den genannten Beschwerden leiden.</a:t>
+            </a:r>
+          </a:p>
+        </p:txBody>
+      </p:sp>
+      <p:sp>
+        <p:nvSpPr>
+          <p:cNvPr id="4" name="Foliennummernplatzhalter 3"/>
+          <p:cNvSpPr>
+            <a:spLocks noGrp="1"/>
+          </p:cNvSpPr>
+          <p:nvPr>
+            <p:ph type="sldNum" sz="quarter" idx="5"/>
+          </p:nvPr>
+        </p:nvSpPr>
+        <p:spPr/>
+        <p:txBody>
+          <a:bodyPr/>
+          <a:lstStyle/>
+          <a:p>
+            <a:fld id="{87C8FFAB-5EC1-4C26-94C4-260FB07841FC}" type="slidenum">
+              <a:rPr lang="de-DE" smtClean="0"/>
+              <a:t>7</a:t>
+            </a:fld>
+            <a:endParaRPr lang="de-DE"/>
+          </a:p>
+        </p:txBody>
+      </p:sp>
+    </p:spTree>
+    <p:extLst>
+      <p:ext uri="{BB962C8B-B14F-4D97-AF65-F5344CB8AC3E}">
+        <p14:creationId xmlns:p14="http://schemas.microsoft.com/office/powerpoint/2010/main" val="1517776072"/>
+      </p:ext>
+    </p:extLst>
+  </p:cSld>
+  <p:clrMapOvr>
+    <a:masterClrMapping/>
+  </p:clrMapOvr>
+</p:notes>
+</file>
+
+<file path=ppt/notesSlides/notesSlide6.xml><?xml version="1.0" encoding="utf-8"?>
+<p:notes xmlns:a="http://schemas.openxmlformats.org/drawingml/2006/main" xmlns:r="http://schemas.openxmlformats.org/officeDocument/2006/relationships" xmlns:p="http://schemas.openxmlformats.org/presentationml/2006/main">
+  <p:cSld>
+    <p:spTree>
+      <p:nvGrpSpPr>
+        <p:cNvPr id="1" name=""/>
+        <p:cNvGrpSpPr/>
+        <p:nvPr/>
+      </p:nvGrpSpPr>
+      <p:grpSpPr>
+        <a:xfrm>
+          <a:off x="0" y="0"/>
+          <a:ext cx="0" cy="0"/>
+          <a:chOff x="0" y="0"/>
+          <a:chExt cx="0" cy="0"/>
+        </a:xfrm>
+      </p:grpSpPr>
+      <p:sp>
+        <p:nvSpPr>
+          <p:cNvPr id="2" name="Folienbildplatzhalter 1"/>
+          <p:cNvSpPr>
+            <a:spLocks noGrp="1" noRot="1" noChangeAspect="1"/>
+          </p:cNvSpPr>
+          <p:nvPr>
+            <p:ph type="sldImg"/>
+          </p:nvPr>
+        </p:nvSpPr>
+        <p:spPr/>
+      </p:sp>
+      <p:sp>
+        <p:nvSpPr>
+          <p:cNvPr id="3" name="Notizenplatzhalter 2"/>
+          <p:cNvSpPr>
+            <a:spLocks noGrp="1"/>
+          </p:cNvSpPr>
+          <p:nvPr>
+            <p:ph type="body" idx="1"/>
+          </p:nvPr>
+        </p:nvSpPr>
+        <p:spPr/>
+        <p:txBody>
+          <a:bodyPr/>
+          <a:lstStyle/>
+          <a:p>
+            <a:r>
+              <a:rPr lang="de-DE" dirty="0"/>
+              <a:t>Als nächstes gehen wir auf die drei genutzten Trainingsverfahren ein und präsentieren sie im Vergleich:</a:t>
+            </a:r>
+          </a:p>
+          <a:p>
+            <a:pPr marL="171450" indent="-171450">
+              <a:buFontTx/>
+              <a:buChar char="-"/>
+            </a:pPr>
+            <a:r>
+              <a:rPr lang="de-DE" dirty="0"/>
+              <a:t>Logistische Regression</a:t>
+            </a:r>
+          </a:p>
+          <a:p>
+            <a:pPr marL="628650" lvl="1" indent="-171450">
+              <a:buFontTx/>
+              <a:buChar char="-"/>
+            </a:pPr>
+            <a:r>
+              <a:rPr lang="de-DE" dirty="0"/>
+              <a:t>Koeffizienten der 16 Einflussvariablen berechnet</a:t>
+            </a:r>
+          </a:p>
+          <a:p>
+            <a:pPr marL="628650" lvl="1" indent="-171450">
+              <a:buFontTx/>
+              <a:buChar char="-"/>
+            </a:pPr>
+            <a:r>
+              <a:rPr lang="de-DE" dirty="0" err="1"/>
+              <a:t>Intercept</a:t>
+            </a:r>
+            <a:r>
+              <a:rPr lang="de-DE" dirty="0"/>
+              <a:t> ist -6,89</a:t>
+            </a:r>
+          </a:p>
+          <a:p>
+            <a:pPr marL="171450" lvl="0" indent="-171450">
+              <a:buFontTx/>
+              <a:buChar char="-"/>
+            </a:pPr>
+            <a:r>
+              <a:rPr lang="de-DE" dirty="0"/>
+              <a:t>Neuronales Netz</a:t>
+            </a:r>
+          </a:p>
+          <a:p>
+            <a:pPr marL="628650" lvl="1" indent="-171450">
+              <a:buFontTx/>
+              <a:buChar char="-"/>
+            </a:pPr>
+            <a:r>
+              <a:rPr lang="de-DE" dirty="0"/>
+              <a:t>Tuningparameter sind Anzahl Hidden Layer, Neuronen und Epochen</a:t>
+            </a:r>
+          </a:p>
+          <a:p>
+            <a:pPr marL="628650" lvl="1" indent="-171450">
+              <a:buFontTx/>
+              <a:buChar char="-"/>
+            </a:pPr>
+            <a:r>
+              <a:rPr lang="de-DE" dirty="0"/>
+              <a:t>Beste Tuning-Kombination durch Experimente mit verschiedenen Anordnungen erhalten</a:t>
+            </a:r>
+          </a:p>
+          <a:p>
+            <a:pPr marL="628650" lvl="1" indent="-171450">
+              <a:buFontTx/>
+              <a:buChar char="-"/>
+            </a:pPr>
+            <a:r>
+              <a:rPr lang="de-DE" dirty="0"/>
+              <a:t>Gewähltes Modell: [15,8,15] Hidden Layer über 120 Epochen</a:t>
+            </a:r>
+          </a:p>
+          <a:p>
+            <a:pPr marL="171450" lvl="0" indent="-171450">
+              <a:buFontTx/>
+              <a:buChar char="-"/>
+            </a:pPr>
+            <a:r>
+              <a:rPr lang="de-DE" dirty="0"/>
+              <a:t>Entscheidungsbäume</a:t>
+            </a:r>
+          </a:p>
+          <a:p>
+            <a:pPr marL="628650" lvl="1" indent="-171450">
+              <a:buFontTx/>
+              <a:buChar char="-"/>
+            </a:pPr>
+            <a:r>
+              <a:rPr lang="de-DE" dirty="0"/>
+              <a:t>Tuningparameter k = Anzahl Knoten</a:t>
+            </a:r>
+          </a:p>
+          <a:p>
+            <a:pPr marL="628650" lvl="1" indent="-171450">
+              <a:buFontTx/>
+              <a:buChar char="-"/>
+            </a:pPr>
+            <a:r>
+              <a:rPr lang="de-DE" dirty="0"/>
+              <a:t>Experimente mit verschiedenen k durchgeführt</a:t>
+            </a:r>
+          </a:p>
+          <a:p>
+            <a:pPr marL="628650" lvl="1" indent="-171450">
+              <a:buFontTx/>
+              <a:buChar char="-"/>
+            </a:pPr>
+            <a:r>
+              <a:rPr lang="de-DE" dirty="0"/>
+              <a:t>Interessanterweise ist k = 2 bereits die optimale Lösung für einen Entscheidungsbaum, alle höheren Werte ergaben den gleichen Baum</a:t>
+            </a:r>
+          </a:p>
+          <a:p>
+            <a:pPr marL="628650" lvl="1" indent="-171450">
+              <a:buFontTx/>
+              <a:buChar char="-"/>
+            </a:pPr>
+            <a:r>
+              <a:rPr lang="de-DE" dirty="0"/>
+              <a:t>Der Algorithmus hat übermäßig viel Wert auf das Merkmal „Geschlecht“ gelegt, wodurch eine Sensitivität von nur knapp über 50% entstanden ist</a:t>
+            </a:r>
+          </a:p>
+        </p:txBody>
+      </p:sp>
+      <p:sp>
+        <p:nvSpPr>
+          <p:cNvPr id="4" name="Foliennummernplatzhalter 3"/>
+          <p:cNvSpPr>
+            <a:spLocks noGrp="1"/>
+          </p:cNvSpPr>
+          <p:nvPr>
+            <p:ph type="sldNum" sz="quarter" idx="5"/>
+          </p:nvPr>
+        </p:nvSpPr>
+        <p:spPr/>
+        <p:txBody>
+          <a:bodyPr/>
+          <a:lstStyle/>
+          <a:p>
+            <a:fld id="{87C8FFAB-5EC1-4C26-94C4-260FB07841FC}" type="slidenum">
+              <a:rPr lang="de-DE" smtClean="0"/>
+              <a:t>8</a:t>
+            </a:fld>
+            <a:endParaRPr lang="de-DE"/>
+          </a:p>
+        </p:txBody>
+      </p:sp>
+    </p:spTree>
+    <p:extLst>
+      <p:ext uri="{BB962C8B-B14F-4D97-AF65-F5344CB8AC3E}">
+        <p14:creationId xmlns:p14="http://schemas.microsoft.com/office/powerpoint/2010/main" val="299808362"/>
+      </p:ext>
+    </p:extLst>
+  </p:cSld>
+  <p:clrMapOvr>
+    <a:masterClrMapping/>
+  </p:clrMapOvr>
+</p:notes>
+</file>
+
+<file path=ppt/notesSlides/notesSlide7.xml><?xml version="1.0" encoding="utf-8"?>
+<p:notes xmlns:a="http://schemas.openxmlformats.org/drawingml/2006/main" xmlns:r="http://schemas.openxmlformats.org/officeDocument/2006/relationships" xmlns:p="http://schemas.openxmlformats.org/presentationml/2006/main">
+  <p:cSld>
+    <p:spTree>
+      <p:nvGrpSpPr>
+        <p:cNvPr id="1" name=""/>
+        <p:cNvGrpSpPr/>
+        <p:nvPr/>
+      </p:nvGrpSpPr>
+      <p:grpSpPr>
+        <a:xfrm>
+          <a:off x="0" y="0"/>
+          <a:ext cx="0" cy="0"/>
+          <a:chOff x="0" y="0"/>
+          <a:chExt cx="0" cy="0"/>
+        </a:xfrm>
+      </p:grpSpPr>
+      <p:sp>
+        <p:nvSpPr>
+          <p:cNvPr id="2" name="Folienbildplatzhalter 1"/>
+          <p:cNvSpPr>
+            <a:spLocks noGrp="1" noRot="1" noChangeAspect="1"/>
+          </p:cNvSpPr>
+          <p:nvPr>
+            <p:ph type="sldImg"/>
+          </p:nvPr>
+        </p:nvSpPr>
+        <p:spPr/>
+      </p:sp>
+      <p:sp>
+        <p:nvSpPr>
+          <p:cNvPr id="3" name="Notizenplatzhalter 2"/>
+          <p:cNvSpPr>
+            <a:spLocks noGrp="1"/>
+          </p:cNvSpPr>
+          <p:nvPr>
+            <p:ph type="body" idx="1"/>
+          </p:nvPr>
+        </p:nvSpPr>
+        <p:spPr/>
+        <p:txBody>
+          <a:bodyPr/>
+          <a:lstStyle/>
+          <a:p>
+            <a:r>
+              <a:rPr lang="de-DE" dirty="0"/>
+              <a:t>Nach diesem Vergleich geben wir noch eine Empfehlung, welches </a:t>
+            </a:r>
+            <a:r>
+              <a:rPr lang="de-DE" dirty="0" err="1"/>
+              <a:t>machine</a:t>
+            </a:r>
+            <a:r>
+              <a:rPr lang="de-DE" dirty="0"/>
+              <a:t> </a:t>
+            </a:r>
+            <a:r>
+              <a:rPr lang="de-DE" dirty="0" err="1"/>
+              <a:t>learning</a:t>
+            </a:r>
+            <a:r>
+              <a:rPr lang="de-DE" dirty="0"/>
+              <a:t> Verfahren für unseren Use Case die besten Ergebnisse liefert:</a:t>
+            </a:r>
+          </a:p>
+          <a:p>
+            <a:endParaRPr lang="de-DE" dirty="0"/>
+          </a:p>
+          <a:p>
+            <a:r>
+              <a:rPr lang="de-DE" dirty="0"/>
+              <a:t>Wichtigstes Kriterium dabei ist die </a:t>
+            </a:r>
+            <a:r>
+              <a:rPr lang="de-DE" dirty="0" err="1"/>
+              <a:t>Missclassification</a:t>
+            </a:r>
+            <a:r>
+              <a:rPr lang="de-DE" dirty="0"/>
+              <a:t> Error Rate, kurz MER, die möglichst niedrig gehalten werden muss, um </a:t>
+            </a:r>
+            <a:r>
+              <a:rPr lang="de-DE" dirty="0" err="1"/>
+              <a:t>Kund:innen</a:t>
+            </a:r>
+            <a:r>
+              <a:rPr lang="de-DE" dirty="0"/>
+              <a:t> beispielsweise nicht fälschlich der Lüge zu bezichtigen.</a:t>
+            </a:r>
+          </a:p>
+          <a:p>
+            <a:r>
+              <a:rPr lang="de-DE" dirty="0"/>
+              <a:t>Auch die Sensitivität, bzw. die True-Positive-Rate, ist wichtig, um möglichst viele rauchende Personen aufzudecken und so nicht kalkulierbaren Schaden für die Versicherungsgesellschaften zu minimieren.</a:t>
+            </a:r>
+          </a:p>
+          <a:p>
+            <a:endParaRPr lang="de-DE" dirty="0"/>
+          </a:p>
+          <a:p>
+            <a:r>
+              <a:rPr lang="de-DE" dirty="0"/>
+              <a:t>Im Vergleich stellt sich heraus, dass die Lineare Regression durch die beste MER und jeweils mittlere Werte in </a:t>
+            </a:r>
+            <a:r>
+              <a:rPr lang="de-DE" dirty="0" err="1"/>
+              <a:t>Sensititvität</a:t>
+            </a:r>
+            <a:r>
+              <a:rPr lang="de-DE" dirty="0"/>
+              <a:t> und Spezifizität insgesamt die beste Wahl aus den drei Verfahren für diese Aufgabe ist.</a:t>
+            </a:r>
+          </a:p>
+        </p:txBody>
+      </p:sp>
+      <p:sp>
+        <p:nvSpPr>
+          <p:cNvPr id="4" name="Foliennummernplatzhalter 3"/>
+          <p:cNvSpPr>
+            <a:spLocks noGrp="1"/>
+          </p:cNvSpPr>
+          <p:nvPr>
+            <p:ph type="sldNum" sz="quarter" idx="5"/>
+          </p:nvPr>
+        </p:nvSpPr>
+        <p:spPr/>
+        <p:txBody>
+          <a:bodyPr/>
+          <a:lstStyle/>
+          <a:p>
+            <a:fld id="{87C8FFAB-5EC1-4C26-94C4-260FB07841FC}" type="slidenum">
+              <a:rPr lang="de-DE" smtClean="0"/>
+              <a:t>9</a:t>
+            </a:fld>
+            <a:endParaRPr lang="de-DE"/>
+          </a:p>
+        </p:txBody>
+      </p:sp>
+    </p:spTree>
+    <p:extLst>
+      <p:ext uri="{BB962C8B-B14F-4D97-AF65-F5344CB8AC3E}">
+        <p14:creationId xmlns:p14="http://schemas.microsoft.com/office/powerpoint/2010/main" val="3670405296"/>
+      </p:ext>
+    </p:extLst>
+  </p:cSld>
+  <p:clrMapOvr>
+    <a:masterClrMapping/>
+  </p:clrMapOvr>
+</p:notes>
 </file>
 
 <file path=ppt/slideLayouts/slideLayout1.xml><?xml version="1.0" encoding="utf-8"?>
@@ -15409,7 +16730,7 @@
         </p:xfrm>
         <a:graphic>
           <a:graphicData uri="http://schemas.openxmlformats.org/drawingml/2006/diagram">
-            <dgm:relIds xmlns:dgm="http://schemas.openxmlformats.org/drawingml/2006/diagram" xmlns:r="http://schemas.openxmlformats.org/officeDocument/2006/relationships" r:dm="rId2" r:lo="rId3" r:qs="rId4" r:cs="rId5"/>
+            <dgm:relIds xmlns:dgm="http://schemas.openxmlformats.org/drawingml/2006/diagram" xmlns:r="http://schemas.openxmlformats.org/officeDocument/2006/relationships" r:dm="rId3" r:lo="rId4" r:qs="rId5" r:cs="rId6"/>
           </a:graphicData>
         </a:graphic>
       </p:graphicFrame>
@@ -23660,7 +24981,7 @@
           <p:nvPr/>
         </p:nvPicPr>
         <p:blipFill>
-          <a:blip r:embed="rId2">
+          <a:blip r:embed="rId3">
             <a:extLst>
               <a:ext uri="{28A0092B-C50C-407E-A947-70E740481C1C}">
                 <a14:useLocalDpi xmlns:a14="http://schemas.microsoft.com/office/drawing/2010/main" val="0"/>
@@ -23881,7 +25202,7 @@
           <p:nvPr/>
         </p:nvPicPr>
         <p:blipFill>
-          <a:blip r:embed="rId3">
+          <a:blip r:embed="rId4">
             <a:extLst>
               <a:ext uri="{28A0092B-C50C-407E-A947-70E740481C1C}">
                 <a14:useLocalDpi xmlns:a14="http://schemas.microsoft.com/office/drawing/2010/main" val="0"/>
@@ -23983,7 +25304,7 @@
           <p:nvPr/>
         </p:nvPicPr>
         <p:blipFill>
-          <a:blip r:embed="rId4">
+          <a:blip r:embed="rId5">
             <a:extLst>
               <a:ext uri="{28A0092B-C50C-407E-A947-70E740481C1C}">
                 <a14:useLocalDpi xmlns:a14="http://schemas.microsoft.com/office/drawing/2010/main" val="0"/>
@@ -25072,7 +26393,7 @@
           <p:nvPr/>
         </p:nvPicPr>
         <p:blipFill>
-          <a:blip r:embed="rId2">
+          <a:blip r:embed="rId3">
             <a:extLst>
               <a:ext uri="{28A0092B-C50C-407E-A947-70E740481C1C}">
                 <a14:useLocalDpi xmlns:a14="http://schemas.microsoft.com/office/drawing/2010/main" val="0"/>
@@ -25168,7 +26489,7 @@
           <p:nvPr/>
         </p:nvPicPr>
         <p:blipFill>
-          <a:blip r:embed="rId3">
+          <a:blip r:embed="rId4">
             <a:extLst>
               <a:ext uri="{28A0092B-C50C-407E-A947-70E740481C1C}">
                 <a14:useLocalDpi xmlns:a14="http://schemas.microsoft.com/office/drawing/2010/main" val="0"/>
@@ -25266,7 +26587,7 @@
           </p:nvPr>
         </p:nvPicPr>
         <p:blipFill>
-          <a:blip r:embed="rId4">
+          <a:blip r:embed="rId5">
             <a:extLst>
               <a:ext uri="{28A0092B-C50C-407E-A947-70E740481C1C}">
                 <a14:useLocalDpi xmlns:a14="http://schemas.microsoft.com/office/drawing/2010/main" val="0"/>
@@ -25362,7 +26683,7 @@
           <p:nvPr/>
         </p:nvPicPr>
         <p:blipFill>
-          <a:blip r:embed="rId5">
+          <a:blip r:embed="rId6">
             <a:extLst>
               <a:ext uri="{28A0092B-C50C-407E-A947-70E740481C1C}">
                 <a14:useLocalDpi xmlns:a14="http://schemas.microsoft.com/office/drawing/2010/main" val="0"/>
@@ -26240,7 +27561,7 @@
           <p:nvPr/>
         </p:nvPicPr>
         <p:blipFill>
-          <a:blip r:embed="rId2">
+          <a:blip r:embed="rId3">
             <a:extLst>
               <a:ext uri="{28A0092B-C50C-407E-A947-70E740481C1C}">
                 <a14:useLocalDpi xmlns:a14="http://schemas.microsoft.com/office/drawing/2010/main" val="0"/>
@@ -26336,7 +27657,7 @@
           <p:nvPr/>
         </p:nvPicPr>
         <p:blipFill>
-          <a:blip r:embed="rId3">
+          <a:blip r:embed="rId4">
             <a:extLst>
               <a:ext uri="{28A0092B-C50C-407E-A947-70E740481C1C}">
                 <a14:useLocalDpi xmlns:a14="http://schemas.microsoft.com/office/drawing/2010/main" val="0"/>
@@ -26432,7 +27753,7 @@
           <p:nvPr/>
         </p:nvPicPr>
         <p:blipFill>
-          <a:blip r:embed="rId4"/>
+          <a:blip r:embed="rId5"/>
           <a:stretch>
             <a:fillRect/>
           </a:stretch>
@@ -26524,7 +27845,7 @@
           </p:nvPr>
         </p:nvPicPr>
         <p:blipFill>
-          <a:blip r:embed="rId5">
+          <a:blip r:embed="rId6">
             <a:extLst>
               <a:ext uri="{28A0092B-C50C-407E-A947-70E740481C1C}">
                 <a14:useLocalDpi xmlns:a14="http://schemas.microsoft.com/office/drawing/2010/main" val="0"/>
@@ -27068,7 +28389,7 @@
         </p:xfrm>
         <a:graphic>
           <a:graphicData uri="http://schemas.openxmlformats.org/drawingml/2006/diagram">
-            <dgm:relIds xmlns:dgm="http://schemas.openxmlformats.org/drawingml/2006/diagram" xmlns:r="http://schemas.openxmlformats.org/officeDocument/2006/relationships" r:dm="rId2" r:lo="rId3" r:qs="rId4" r:cs="rId5"/>
+            <dgm:relIds xmlns:dgm="http://schemas.openxmlformats.org/drawingml/2006/diagram" xmlns:r="http://schemas.openxmlformats.org/officeDocument/2006/relationships" r:dm="rId3" r:lo="rId4" r:qs="rId5" r:cs="rId6"/>
           </a:graphicData>
         </a:graphic>
       </p:graphicFrame>
@@ -27087,7 +28408,7 @@
           <p:nvPr/>
         </p:nvPicPr>
         <p:blipFill>
-          <a:blip r:embed="rId7">
+          <a:blip r:embed="rId8">
             <a:extLst>
               <a:ext uri="{28A0092B-C50C-407E-A947-70E740481C1C}">
                 <a14:useLocalDpi xmlns:a14="http://schemas.microsoft.com/office/drawing/2010/main" val="0"/>
@@ -27123,7 +28444,7 @@
           <p:nvPr/>
         </p:nvPicPr>
         <p:blipFill>
-          <a:blip r:embed="rId8">
+          <a:blip r:embed="rId9">
             <a:extLst>
               <a:ext uri="{28A0092B-C50C-407E-A947-70E740481C1C}">
                 <a14:useLocalDpi xmlns:a14="http://schemas.microsoft.com/office/drawing/2010/main" val="0"/>
@@ -27158,7 +28479,7 @@
           <p:nvPr/>
         </p:nvPicPr>
         <p:blipFill>
-          <a:blip r:embed="rId9">
+          <a:blip r:embed="rId10">
             <a:extLst>
               <a:ext uri="{28A0092B-C50C-407E-A947-70E740481C1C}">
                 <a14:useLocalDpi xmlns:a14="http://schemas.microsoft.com/office/drawing/2010/main" val="0"/>
@@ -29195,13 +30516,13 @@
             <p:nvPr/>
           </p:nvPicPr>
           <p:blipFill>
-            <a:blip r:embed="rId2">
+            <a:blip r:embed="rId3">
               <a:extLst>
                 <a:ext uri="{28A0092B-C50C-407E-A947-70E740481C1C}">
                   <a14:useLocalDpi xmlns:a14="http://schemas.microsoft.com/office/drawing/2010/main" val="0"/>
                 </a:ext>
                 <a:ext uri="{96DAC541-7B7A-43D3-8B79-37D633B846F1}">
-                  <asvg:svgBlip xmlns:asvg="http://schemas.microsoft.com/office/drawing/2016/SVG/main" r:embed="rId3"/>
+                  <asvg:svgBlip xmlns:asvg="http://schemas.microsoft.com/office/drawing/2016/SVG/main" r:embed="rId4"/>
                 </a:ext>
               </a:extLst>
             </a:blip>
@@ -29309,13 +30630,13 @@
             <p:nvPr/>
           </p:nvPicPr>
           <p:blipFill>
-            <a:blip r:embed="rId4">
+            <a:blip r:embed="rId5">
               <a:extLst>
                 <a:ext uri="{28A0092B-C50C-407E-A947-70E740481C1C}">
                   <a14:useLocalDpi xmlns:a14="http://schemas.microsoft.com/office/drawing/2010/main" val="0"/>
                 </a:ext>
                 <a:ext uri="{96DAC541-7B7A-43D3-8B79-37D633B846F1}">
-                  <asvg:svgBlip xmlns:asvg="http://schemas.microsoft.com/office/drawing/2016/SVG/main" r:embed="rId5"/>
+                  <asvg:svgBlip xmlns:asvg="http://schemas.microsoft.com/office/drawing/2016/SVG/main" r:embed="rId6"/>
                 </a:ext>
               </a:extLst>
             </a:blip>
@@ -29427,13 +30748,13 @@
             <p:nvPr/>
           </p:nvPicPr>
           <p:blipFill>
-            <a:blip r:embed="rId6">
+            <a:blip r:embed="rId7">
               <a:extLst>
                 <a:ext uri="{28A0092B-C50C-407E-A947-70E740481C1C}">
                   <a14:useLocalDpi xmlns:a14="http://schemas.microsoft.com/office/drawing/2010/main" val="0"/>
                 </a:ext>
                 <a:ext uri="{96DAC541-7B7A-43D3-8B79-37D633B846F1}">
-                  <asvg:svgBlip xmlns:asvg="http://schemas.microsoft.com/office/drawing/2016/SVG/main" r:embed="rId7"/>
+                  <asvg:svgBlip xmlns:asvg="http://schemas.microsoft.com/office/drawing/2016/SVG/main" r:embed="rId8"/>
                 </a:ext>
               </a:extLst>
             </a:blip>
@@ -30649,4 +31970,299 @@
     </a:ext>
   </a:extLst>
 </a:theme>
+</file>
+
+<file path=ppt/theme/theme2.xml><?xml version="1.0" encoding="utf-8"?>
+<a:theme xmlns:a="http://schemas.openxmlformats.org/drawingml/2006/main" name="Office">
+  <a:themeElements>
+    <a:clrScheme name="Office">
+      <a:dk1>
+        <a:sysClr val="windowText" lastClr="000000"/>
+      </a:dk1>
+      <a:lt1>
+        <a:sysClr val="window" lastClr="FFFFFF"/>
+      </a:lt1>
+      <a:dk2>
+        <a:srgbClr val="44546A"/>
+      </a:dk2>
+      <a:lt2>
+        <a:srgbClr val="E7E6E6"/>
+      </a:lt2>
+      <a:accent1>
+        <a:srgbClr val="4472C4"/>
+      </a:accent1>
+      <a:accent2>
+        <a:srgbClr val="ED7D31"/>
+      </a:accent2>
+      <a:accent3>
+        <a:srgbClr val="A5A5A5"/>
+      </a:accent3>
+      <a:accent4>
+        <a:srgbClr val="FFC000"/>
+      </a:accent4>
+      <a:accent5>
+        <a:srgbClr val="5B9BD5"/>
+      </a:accent5>
+      <a:accent6>
+        <a:srgbClr val="70AD47"/>
+      </a:accent6>
+      <a:hlink>
+        <a:srgbClr val="0563C1"/>
+      </a:hlink>
+      <a:folHlink>
+        <a:srgbClr val="954F72"/>
+      </a:folHlink>
+    </a:clrScheme>
+    <a:fontScheme name="Office">
+      <a:majorFont>
+        <a:latin typeface="Calibri Light" panose="020F0302020204030204"/>
+        <a:ea typeface=""/>
+        <a:cs typeface=""/>
+        <a:font script="Jpan" typeface="游ゴシック Light"/>
+        <a:font script="Hang" typeface="맑은 고딕"/>
+        <a:font script="Hans" typeface="等线 Light"/>
+        <a:font script="Hant" typeface="新細明體"/>
+        <a:font script="Arab" typeface="Times New Roman"/>
+        <a:font script="Hebr" typeface="Times New Roman"/>
+        <a:font script="Thai" typeface="Angsana New"/>
+        <a:font script="Ethi" typeface="Nyala"/>
+        <a:font script="Beng" typeface="Vrinda"/>
+        <a:font script="Gujr" typeface="Shruti"/>
+        <a:font script="Khmr" typeface="MoolBoran"/>
+        <a:font script="Knda" typeface="Tunga"/>
+        <a:font script="Guru" typeface="Raavi"/>
+        <a:font script="Cans" typeface="Euphemia"/>
+        <a:font script="Cher" typeface="Plantagenet Cherokee"/>
+        <a:font script="Yiii" typeface="Microsoft Yi Baiti"/>
+        <a:font script="Tibt" typeface="Microsoft Himalaya"/>
+        <a:font script="Thaa" typeface="MV Boli"/>
+        <a:font script="Deva" typeface="Mangal"/>
+        <a:font script="Telu" typeface="Gautami"/>
+        <a:font script="Taml" typeface="Latha"/>
+        <a:font script="Syrc" typeface="Estrangelo Edessa"/>
+        <a:font script="Orya" typeface="Kalinga"/>
+        <a:font script="Mlym" typeface="Kartika"/>
+        <a:font script="Laoo" typeface="DokChampa"/>
+        <a:font script="Sinh" typeface="Iskoola Pota"/>
+        <a:font script="Mong" typeface="Mongolian Baiti"/>
+        <a:font script="Viet" typeface="Times New Roman"/>
+        <a:font script="Uigh" typeface="Microsoft Uighur"/>
+        <a:font script="Geor" typeface="Sylfaen"/>
+        <a:font script="Armn" typeface="Arial"/>
+        <a:font script="Bugi" typeface="Leelawadee UI"/>
+        <a:font script="Bopo" typeface="Microsoft JhengHei"/>
+        <a:font script="Java" typeface="Javanese Text"/>
+        <a:font script="Lisu" typeface="Segoe UI"/>
+        <a:font script="Mymr" typeface="Myanmar Text"/>
+        <a:font script="Nkoo" typeface="Ebrima"/>
+        <a:font script="Olck" typeface="Nirmala UI"/>
+        <a:font script="Osma" typeface="Ebrima"/>
+        <a:font script="Phag" typeface="Phagspa"/>
+        <a:font script="Syrn" typeface="Estrangelo Edessa"/>
+        <a:font script="Syrj" typeface="Estrangelo Edessa"/>
+        <a:font script="Syre" typeface="Estrangelo Edessa"/>
+        <a:font script="Sora" typeface="Nirmala UI"/>
+        <a:font script="Tale" typeface="Microsoft Tai Le"/>
+        <a:font script="Talu" typeface="Microsoft New Tai Lue"/>
+        <a:font script="Tfng" typeface="Ebrima"/>
+      </a:majorFont>
+      <a:minorFont>
+        <a:latin typeface="Calibri" panose="020F0502020204030204"/>
+        <a:ea typeface=""/>
+        <a:cs typeface=""/>
+        <a:font script="Jpan" typeface="游ゴシック"/>
+        <a:font script="Hang" typeface="맑은 고딕"/>
+        <a:font script="Hans" typeface="等线"/>
+        <a:font script="Hant" typeface="新細明體"/>
+        <a:font script="Arab" typeface="Arial"/>
+        <a:font script="Hebr" typeface="Arial"/>
+        <a:font script="Thai" typeface="Cordia New"/>
+        <a:font script="Ethi" typeface="Nyala"/>
+        <a:font script="Beng" typeface="Vrinda"/>
+        <a:font script="Gujr" typeface="Shruti"/>
+        <a:font script="Khmr" typeface="DaunPenh"/>
+        <a:font script="Knda" typeface="Tunga"/>
+        <a:font script="Guru" typeface="Raavi"/>
+        <a:font script="Cans" typeface="Euphemia"/>
+        <a:font script="Cher" typeface="Plantagenet Cherokee"/>
+        <a:font script="Yiii" typeface="Microsoft Yi Baiti"/>
+        <a:font script="Tibt" typeface="Microsoft Himalaya"/>
+        <a:font script="Thaa" typeface="MV Boli"/>
+        <a:font script="Deva" typeface="Mangal"/>
+        <a:font script="Telu" typeface="Gautami"/>
+        <a:font script="Taml" typeface="Latha"/>
+        <a:font script="Syrc" typeface="Estrangelo Edessa"/>
+        <a:font script="Orya" typeface="Kalinga"/>
+        <a:font script="Mlym" typeface="Kartika"/>
+        <a:font script="Laoo" typeface="DokChampa"/>
+        <a:font script="Sinh" typeface="Iskoola Pota"/>
+        <a:font script="Mong" typeface="Mongolian Baiti"/>
+        <a:font script="Viet" typeface="Arial"/>
+        <a:font script="Uigh" typeface="Microsoft Uighur"/>
+        <a:font script="Geor" typeface="Sylfaen"/>
+        <a:font script="Armn" typeface="Arial"/>
+        <a:font script="Bugi" typeface="Leelawadee UI"/>
+        <a:font script="Bopo" typeface="Microsoft JhengHei"/>
+        <a:font script="Java" typeface="Javanese Text"/>
+        <a:font script="Lisu" typeface="Segoe UI"/>
+        <a:font script="Mymr" typeface="Myanmar Text"/>
+        <a:font script="Nkoo" typeface="Ebrima"/>
+        <a:font script="Olck" typeface="Nirmala UI"/>
+        <a:font script="Osma" typeface="Ebrima"/>
+        <a:font script="Phag" typeface="Phagspa"/>
+        <a:font script="Syrn" typeface="Estrangelo Edessa"/>
+        <a:font script="Syrj" typeface="Estrangelo Edessa"/>
+        <a:font script="Syre" typeface="Estrangelo Edessa"/>
+        <a:font script="Sora" typeface="Nirmala UI"/>
+        <a:font script="Tale" typeface="Microsoft Tai Le"/>
+        <a:font script="Talu" typeface="Microsoft New Tai Lue"/>
+        <a:font script="Tfng" typeface="Ebrima"/>
+      </a:minorFont>
+    </a:fontScheme>
+    <a:fmtScheme name="Office">
+      <a:fillStyleLst>
+        <a:solidFill>
+          <a:schemeClr val="phClr"/>
+        </a:solidFill>
+        <a:gradFill rotWithShape="1">
+          <a:gsLst>
+            <a:gs pos="0">
+              <a:schemeClr val="phClr">
+                <a:lumMod val="110000"/>
+                <a:satMod val="105000"/>
+                <a:tint val="67000"/>
+              </a:schemeClr>
+            </a:gs>
+            <a:gs pos="50000">
+              <a:schemeClr val="phClr">
+                <a:lumMod val="105000"/>
+                <a:satMod val="103000"/>
+                <a:tint val="73000"/>
+              </a:schemeClr>
+            </a:gs>
+            <a:gs pos="100000">
+              <a:schemeClr val="phClr">
+                <a:lumMod val="105000"/>
+                <a:satMod val="109000"/>
+                <a:tint val="81000"/>
+              </a:schemeClr>
+            </a:gs>
+          </a:gsLst>
+          <a:lin ang="5400000" scaled="0"/>
+        </a:gradFill>
+        <a:gradFill rotWithShape="1">
+          <a:gsLst>
+            <a:gs pos="0">
+              <a:schemeClr val="phClr">
+                <a:satMod val="103000"/>
+                <a:lumMod val="102000"/>
+                <a:tint val="94000"/>
+              </a:schemeClr>
+            </a:gs>
+            <a:gs pos="50000">
+              <a:schemeClr val="phClr">
+                <a:satMod val="110000"/>
+                <a:lumMod val="100000"/>
+                <a:shade val="100000"/>
+              </a:schemeClr>
+            </a:gs>
+            <a:gs pos="100000">
+              <a:schemeClr val="phClr">
+                <a:lumMod val="99000"/>
+                <a:satMod val="120000"/>
+                <a:shade val="78000"/>
+              </a:schemeClr>
+            </a:gs>
+          </a:gsLst>
+          <a:lin ang="5400000" scaled="0"/>
+        </a:gradFill>
+      </a:fillStyleLst>
+      <a:lnStyleLst>
+        <a:ln w="6350" cap="flat" cmpd="sng" algn="ctr">
+          <a:solidFill>
+            <a:schemeClr val="phClr"/>
+          </a:solidFill>
+          <a:prstDash val="solid"/>
+          <a:miter lim="800000"/>
+        </a:ln>
+        <a:ln w="12700" cap="flat" cmpd="sng" algn="ctr">
+          <a:solidFill>
+            <a:schemeClr val="phClr"/>
+          </a:solidFill>
+          <a:prstDash val="solid"/>
+          <a:miter lim="800000"/>
+        </a:ln>
+        <a:ln w="19050" cap="flat" cmpd="sng" algn="ctr">
+          <a:solidFill>
+            <a:schemeClr val="phClr"/>
+          </a:solidFill>
+          <a:prstDash val="solid"/>
+          <a:miter lim="800000"/>
+        </a:ln>
+      </a:lnStyleLst>
+      <a:effectStyleLst>
+        <a:effectStyle>
+          <a:effectLst/>
+        </a:effectStyle>
+        <a:effectStyle>
+          <a:effectLst/>
+        </a:effectStyle>
+        <a:effectStyle>
+          <a:effectLst>
+            <a:outerShdw blurRad="57150" dist="19050" dir="5400000" algn="ctr" rotWithShape="0">
+              <a:srgbClr val="000000">
+                <a:alpha val="63000"/>
+              </a:srgbClr>
+            </a:outerShdw>
+          </a:effectLst>
+        </a:effectStyle>
+      </a:effectStyleLst>
+      <a:bgFillStyleLst>
+        <a:solidFill>
+          <a:schemeClr val="phClr"/>
+        </a:solidFill>
+        <a:solidFill>
+          <a:schemeClr val="phClr">
+            <a:tint val="95000"/>
+            <a:satMod val="170000"/>
+          </a:schemeClr>
+        </a:solidFill>
+        <a:gradFill rotWithShape="1">
+          <a:gsLst>
+            <a:gs pos="0">
+              <a:schemeClr val="phClr">
+                <a:tint val="93000"/>
+                <a:satMod val="150000"/>
+                <a:shade val="98000"/>
+                <a:lumMod val="102000"/>
+              </a:schemeClr>
+            </a:gs>
+            <a:gs pos="50000">
+              <a:schemeClr val="phClr">
+                <a:tint val="98000"/>
+                <a:satMod val="130000"/>
+                <a:shade val="90000"/>
+                <a:lumMod val="103000"/>
+              </a:schemeClr>
+            </a:gs>
+            <a:gs pos="100000">
+              <a:schemeClr val="phClr">
+                <a:shade val="63000"/>
+                <a:satMod val="120000"/>
+              </a:schemeClr>
+            </a:gs>
+          </a:gsLst>
+          <a:lin ang="5400000" scaled="0"/>
+        </a:gradFill>
+      </a:bgFillStyleLst>
+    </a:fmtScheme>
+  </a:themeElements>
+  <a:objectDefaults/>
+  <a:extraClrSchemeLst/>
+  <a:extLst>
+    <a:ext uri="{05A4C25C-085E-4340-85A3-A5531E510DB2}">
+      <thm15:themeFamily xmlns:thm15="http://schemas.microsoft.com/office/thememl/2012/main" name="Office Theme" id="{62F939B6-93AF-4DB8-9C6B-D6C7DFDC589F}" vid="{4A3C46E8-61CC-4603-A589-7422A47A8E4A}"/>
+    </a:ext>
+  </a:extLst>
+</a:theme>
 </file>
</xml_diff>